<commit_message>
matlab pres et renomme 18juillet en backside
</commit_message>
<xml_diff>
--- a/Presentation/26juillet/Presentation-StageSwinburne-27Juillet.pptx
+++ b/Presentation/26juillet/Presentation-StageSwinburne-27Juillet.pptx
@@ -109,7 +109,7 @@
   </p:defaultTextStyle>
   <p:extLst>
     <p:ext uri="{EFAFB233-063F-42B5-8137-9DF3F51BA10A}">
-      <p15:sldGuideLst xmlns="" xmlns:p15="http://schemas.microsoft.com/office/powerpoint/2012/main">
+      <p15:sldGuideLst xmlns:p15="http://schemas.microsoft.com/office/powerpoint/2012/main" xmlns="">
         <p15:guide id="1" orient="horz" pos="2160">
           <p15:clr>
             <a:srgbClr val="A4A3A4"/>
@@ -406,7 +406,7 @@
           <a:p>
             <a:fld id="{AA309A6D-C09C-4548-B29A-6CF363A7E532}" type="datetimeFigureOut">
               <a:rPr lang="fr-FR" smtClean="0"/>
-              <a:t>26/07/2016</a:t>
+              <a:t>27/07/2016</a:t>
             </a:fld>
             <a:endParaRPr lang="fr-BE"/>
           </a:p>
@@ -799,7 +799,7 @@
           <a:p>
             <a:fld id="{AA309A6D-C09C-4548-B29A-6CF363A7E532}" type="datetimeFigureOut">
               <a:rPr lang="fr-FR" smtClean="0"/>
-              <a:t>26/07/2016</a:t>
+              <a:t>27/07/2016</a:t>
             </a:fld>
             <a:endParaRPr lang="fr-BE"/>
           </a:p>
@@ -1331,7 +1331,7 @@
           <a:p>
             <a:fld id="{AA309A6D-C09C-4548-B29A-6CF363A7E532}" type="datetimeFigureOut">
               <a:rPr lang="fr-FR" smtClean="0"/>
-              <a:t>26/07/2016</a:t>
+              <a:t>27/07/2016</a:t>
             </a:fld>
             <a:endParaRPr lang="fr-BE"/>
           </a:p>
@@ -1464,7 +1464,7 @@
           <a:p>
             <a:fld id="{AA309A6D-C09C-4548-B29A-6CF363A7E532}" type="datetimeFigureOut">
               <a:rPr lang="fr-FR" smtClean="0"/>
-              <a:t>26/07/2016</a:t>
+              <a:t>27/07/2016</a:t>
             </a:fld>
             <a:endParaRPr lang="fr-BE"/>
           </a:p>
@@ -2007,7 +2007,7 @@
           <a:p>
             <a:fld id="{AA309A6D-C09C-4548-B29A-6CF363A7E532}" type="datetimeFigureOut">
               <a:rPr lang="fr-FR" smtClean="0"/>
-              <a:t>26/07/2016</a:t>
+              <a:t>27/07/2016</a:t>
             </a:fld>
             <a:endParaRPr lang="fr-BE"/>
           </a:p>
@@ -2302,7 +2302,7 @@
           <a:p>
             <a:fld id="{AA309A6D-C09C-4548-B29A-6CF363A7E532}" type="datetimeFigureOut">
               <a:rPr lang="fr-FR" smtClean="0"/>
-              <a:t>26/07/2016</a:t>
+              <a:t>27/07/2016</a:t>
             </a:fld>
             <a:endParaRPr lang="fr-BE"/>
           </a:p>
@@ -2961,7 +2961,7 @@
           <a:p>
             <a:fld id="{AA309A6D-C09C-4548-B29A-6CF363A7E532}" type="datetimeFigureOut">
               <a:rPr lang="fr-FR" smtClean="0"/>
-              <a:t>26/07/2016</a:t>
+              <a:t>27/07/2016</a:t>
             </a:fld>
             <a:endParaRPr lang="fr-BE"/>
           </a:p>
@@ -3397,7 +3397,7 @@
           <a:p>
             <a:fld id="{AA309A6D-C09C-4548-B29A-6CF363A7E532}" type="datetimeFigureOut">
               <a:rPr lang="fr-FR" smtClean="0"/>
-              <a:t>26/07/2016</a:t>
+              <a:t>27/07/2016</a:t>
             </a:fld>
             <a:endParaRPr lang="fr-BE"/>
           </a:p>
@@ -3710,7 +3710,7 @@
           <a:p>
             <a:fld id="{AA309A6D-C09C-4548-B29A-6CF363A7E532}" type="datetimeFigureOut">
               <a:rPr lang="fr-FR" smtClean="0"/>
-              <a:t>26/07/2016</a:t>
+              <a:t>27/07/2016</a:t>
             </a:fld>
             <a:endParaRPr lang="fr-BE"/>
           </a:p>
@@ -4442,7 +4442,7 @@
           <a:p>
             <a:fld id="{AA309A6D-C09C-4548-B29A-6CF363A7E532}" type="datetimeFigureOut">
               <a:rPr lang="fr-FR" smtClean="0"/>
-              <a:t>26/07/2016</a:t>
+              <a:t>27/07/2016</a:t>
             </a:fld>
             <a:endParaRPr lang="fr-BE"/>
           </a:p>
@@ -5106,7 +5106,7 @@
           <a:p>
             <a:fld id="{AA309A6D-C09C-4548-B29A-6CF363A7E532}" type="datetimeFigureOut">
               <a:rPr lang="fr-FR" smtClean="0"/>
-              <a:t>26/07/2016</a:t>
+              <a:t>27/07/2016</a:t>
             </a:fld>
             <a:endParaRPr lang="fr-BE"/>
           </a:p>
@@ -5379,7 +5379,7 @@
           <a:p>
             <a:fld id="{AA309A6D-C09C-4548-B29A-6CF363A7E532}" type="datetimeFigureOut">
               <a:rPr lang="fr-FR" smtClean="0"/>
-              <a:t>26/07/2016</a:t>
+              <a:t>27/07/2016</a:t>
             </a:fld>
             <a:endParaRPr lang="fr-BE"/>
           </a:p>
@@ -6093,7 +6093,7 @@
         </p:nvGrpSpPr>
         <p:grpSpPr>
           <a:xfrm>
-            <a:off x="323528" y="1544018"/>
+            <a:off x="323528" y="1556792"/>
             <a:ext cx="4248472" cy="3253134"/>
             <a:chOff x="251520" y="1628800"/>
             <a:chExt cx="5697299" cy="3744416"/>
@@ -6293,7 +6293,7 @@
         </p:nvSpPr>
         <p:spPr>
           <a:xfrm>
-            <a:off x="1403648" y="4941168"/>
+            <a:off x="1320148" y="5363924"/>
             <a:ext cx="6503703" cy="369332"/>
           </a:xfrm>
           <a:prstGeom prst="rect">
@@ -6364,6 +6364,66 @@
               <a:t> of the membrane.</a:t>
             </a:r>
             <a:endParaRPr lang="fr-FR" dirty="0"/>
+          </a:p>
+        </p:txBody>
+      </p:sp>
+      <p:sp>
+        <p:nvSpPr>
+          <p:cNvPr id="10" name="ZoneTexte 9"/>
+          <p:cNvSpPr txBox="1"/>
+          <p:nvPr/>
+        </p:nvSpPr>
+        <p:spPr>
+          <a:xfrm>
+            <a:off x="6055298" y="4795162"/>
+            <a:ext cx="1208985" cy="400110"/>
+          </a:xfrm>
+          <a:prstGeom prst="rect">
+            <a:avLst/>
+          </a:prstGeom>
+          <a:noFill/>
+        </p:spPr>
+        <p:txBody>
+          <a:bodyPr wrap="none" rtlCol="0">
+            <a:spAutoFit/>
+          </a:bodyPr>
+          <a:lstStyle/>
+          <a:p>
+            <a:r>
+              <a:rPr lang="fr-FR" sz="2000" dirty="0" err="1" smtClean="0"/>
+              <a:t>frontside</a:t>
+            </a:r>
+            <a:endParaRPr lang="fr-FR" sz="2000" dirty="0"/>
+          </a:p>
+        </p:txBody>
+      </p:sp>
+      <p:sp>
+        <p:nvSpPr>
+          <p:cNvPr id="11" name="ZoneTexte 10"/>
+          <p:cNvSpPr txBox="1"/>
+          <p:nvPr/>
+        </p:nvSpPr>
+        <p:spPr>
+          <a:xfrm>
+            <a:off x="1843271" y="4797152"/>
+            <a:ext cx="1170513" cy="400110"/>
+          </a:xfrm>
+          <a:prstGeom prst="rect">
+            <a:avLst/>
+          </a:prstGeom>
+          <a:noFill/>
+        </p:spPr>
+        <p:txBody>
+          <a:bodyPr wrap="none" rtlCol="0">
+            <a:spAutoFit/>
+          </a:bodyPr>
+          <a:lstStyle/>
+          <a:p>
+            <a:r>
+              <a:rPr lang="fr-FR" sz="2000" dirty="0" err="1" smtClean="0"/>
+              <a:t>backside</a:t>
+            </a:r>
+            <a:endParaRPr lang="fr-FR" sz="2000" dirty="0"/>
           </a:p>
         </p:txBody>
       </p:sp>
@@ -6676,6 +6736,55 @@
           </a:extLst>
         </p:spPr>
       </p:pic>
+      <p:sp>
+        <p:nvSpPr>
+          <p:cNvPr id="2" name="ZoneTexte 1"/>
+          <p:cNvSpPr txBox="1"/>
+          <p:nvPr/>
+        </p:nvSpPr>
+        <p:spPr>
+          <a:xfrm>
+            <a:off x="7798792" y="3204845"/>
+            <a:ext cx="1188146" cy="646331"/>
+          </a:xfrm>
+          <a:prstGeom prst="rect">
+            <a:avLst/>
+          </a:prstGeom>
+          <a:noFill/>
+        </p:spPr>
+        <p:txBody>
+          <a:bodyPr wrap="none" rtlCol="0">
+            <a:spAutoFit/>
+          </a:bodyPr>
+          <a:lstStyle/>
+          <a:p>
+            <a:r>
+              <a:rPr lang="fr-FR" dirty="0" smtClean="0"/>
+              <a:t>45° </a:t>
+            </a:r>
+            <a:r>
+              <a:rPr lang="fr-FR" dirty="0" err="1" smtClean="0"/>
+              <a:t>view</a:t>
+            </a:r>
+            <a:r>
+              <a:rPr lang="fr-FR" dirty="0" smtClean="0"/>
+              <a:t/>
+            </a:r>
+            <a:br>
+              <a:rPr lang="fr-FR" dirty="0" smtClean="0"/>
+            </a:br>
+            <a:r>
+              <a:rPr lang="fr-FR" dirty="0" err="1" smtClean="0"/>
+              <a:t>with</a:t>
+            </a:r>
+            <a:r>
+              <a:rPr lang="fr-FR" dirty="0" smtClean="0"/>
+              <a:t> SEM</a:t>
+            </a:r>
+            <a:endParaRPr lang="fr-FR" dirty="0"/>
+          </a:p>
+        </p:txBody>
+      </p:sp>
     </p:spTree>
     <p:extLst>
       <p:ext uri="{BB962C8B-B14F-4D97-AF65-F5344CB8AC3E}">

</xml_diff>